<commit_message>
Day-3 and Day-4 added, Day-2 modified
</commit_message>
<xml_diff>
--- a/Python PPT/PPTs/day_2.pptx
+++ b/Python PPT/PPTs/day_2.pptx
@@ -9611,7 +9611,7 @@
             </a:pPr>
             <a:r>
               <a:rPr lang="en" dirty="0"/>
-              <a:t>Python - Introduction</a:t>
+              <a:t>Python - Installation</a:t>
             </a:r>
             <a:endParaRPr dirty="0"/>
           </a:p>
@@ -10330,10 +10330,10 @@
       </p:sp>
       <p:pic>
         <p:nvPicPr>
-          <p:cNvPr id="6" name="Picture 5">
+          <p:cNvPr id="3" name="Picture 2">
             <a:extLst>
               <a:ext uri="{FF2B5EF4-FFF2-40B4-BE49-F238E27FC236}">
-                <a16:creationId xmlns:a16="http://schemas.microsoft.com/office/drawing/2014/main" id="{8E1DE572-E494-2FC1-FB96-C58A918B39C5}"/>
+                <a16:creationId xmlns:a16="http://schemas.microsoft.com/office/drawing/2014/main" id="{BBE30547-172C-EB1C-EE40-A3B90FA3AB1A}"/>
               </a:ext>
             </a:extLst>
           </p:cNvPr>
@@ -10350,8 +10350,8 @@
         </p:blipFill>
         <p:spPr>
           <a:xfrm>
-            <a:off x="2033704" y="1600064"/>
-            <a:ext cx="4382112" cy="1943371"/>
+            <a:off x="1158240" y="1159558"/>
+            <a:ext cx="6291188" cy="3384322"/>
           </a:xfrm>
           <a:prstGeom prst="rect">
             <a:avLst/>
@@ -11124,10 +11124,10 @@
       </p:sp>
       <p:pic>
         <p:nvPicPr>
-          <p:cNvPr id="7" name="Picture 6">
+          <p:cNvPr id="4" name="Picture 3">
             <a:extLst>
               <a:ext uri="{FF2B5EF4-FFF2-40B4-BE49-F238E27FC236}">
-                <a16:creationId xmlns:a16="http://schemas.microsoft.com/office/drawing/2014/main" id="{96860C81-83A0-68C6-22CC-56B04F4BFC89}"/>
+                <a16:creationId xmlns:a16="http://schemas.microsoft.com/office/drawing/2014/main" id="{E2D99967-CB62-588A-34EB-CAEAED084B0B}"/>
               </a:ext>
             </a:extLst>
           </p:cNvPr>
@@ -11144,8 +11144,8 @@
         </p:blipFill>
         <p:spPr>
           <a:xfrm>
-            <a:off x="5967028" y="2373701"/>
-            <a:ext cx="2048161" cy="1190791"/>
+            <a:off x="5108456" y="1922906"/>
+            <a:ext cx="3243925" cy="2582419"/>
           </a:xfrm>
           <a:prstGeom prst="rect">
             <a:avLst/>
@@ -11194,7 +11194,7 @@
         </p:nvSpPr>
         <p:spPr>
           <a:xfrm>
-            <a:off x="1814305" y="1164050"/>
+            <a:off x="1802113" y="1200626"/>
             <a:ext cx="4179600" cy="733500"/>
           </a:xfrm>
           <a:prstGeom prst="rect">
@@ -11446,7 +11446,7 @@
         </p:nvSpPr>
         <p:spPr>
           <a:xfrm>
-            <a:off x="1848675" y="1930969"/>
+            <a:off x="1814305" y="1995524"/>
             <a:ext cx="4179600" cy="733500"/>
           </a:xfrm>
           <a:prstGeom prst="rect">
@@ -12682,7 +12682,7 @@
         </p:blipFill>
         <p:spPr>
           <a:xfrm>
-            <a:off x="3246311" y="2571750"/>
+            <a:off x="3645072" y="2441125"/>
             <a:ext cx="1362265" cy="1724266"/>
           </a:xfrm>
           <a:prstGeom prst="rect">

</xml_diff>